<commit_message>
more stuff, updated powerpoint
</commit_message>
<xml_diff>
--- a/TypingTutorPowerPoint.pptx
+++ b/TypingTutorPowerPoint.pptx
@@ -10,10 +10,9 @@
     <p:sldId id="257" r:id="rId4"/>
     <p:sldId id="258" r:id="rId5"/>
     <p:sldId id="259" r:id="rId6"/>
-    <p:sldId id="264" r:id="rId7"/>
-    <p:sldId id="260" r:id="rId8"/>
-    <p:sldId id="261" r:id="rId9"/>
-    <p:sldId id="262" r:id="rId10"/>
+    <p:sldId id="260" r:id="rId7"/>
+    <p:sldId id="261" r:id="rId8"/>
+    <p:sldId id="262" r:id="rId9"/>
   </p:sldIdLst>
   <p:sldSz cx="12192000" cy="6858000"/>
   <p:notesSz cx="6858000" cy="9144000"/>
@@ -112,6 +111,11 @@
       </a:defRPr>
     </a:lvl9pPr>
   </p:defaultTextStyle>
+  <p:extLst>
+    <p:ext uri="{EFAFB233-063F-42B5-8137-9DF3F51BA10A}">
+      <p15:sldGuideLst xmlns:p15="http://schemas.microsoft.com/office/powerpoint/2012/main"/>
+    </p:ext>
+  </p:extLst>
 </p:presentation>
 </file>
 
@@ -841,7 +845,7 @@
           <a:p>
             <a:fld id="{F6AD1AE7-7C2E-44F3-A585-B0B84B769043}" type="datetimeFigureOut">
               <a:rPr lang="en-US" smtClean="0"/>
-              <a:t>4/15/2015</a:t>
+              <a:t>4/16/2015</a:t>
             </a:fld>
             <a:endParaRPr lang="en-US"/>
           </a:p>
@@ -1092,7 +1096,7 @@
           <a:p>
             <a:fld id="{F6AD1AE7-7C2E-44F3-A585-B0B84B769043}" type="datetimeFigureOut">
               <a:rPr lang="en-US" smtClean="0"/>
-              <a:t>4/15/2015</a:t>
+              <a:t>4/16/2015</a:t>
             </a:fld>
             <a:endParaRPr lang="en-US"/>
           </a:p>
@@ -1406,7 +1410,7 @@
           <a:p>
             <a:fld id="{F6AD1AE7-7C2E-44F3-A585-B0B84B769043}" type="datetimeFigureOut">
               <a:rPr lang="en-US" smtClean="0"/>
-              <a:t>4/15/2015</a:t>
+              <a:t>4/16/2015</a:t>
             </a:fld>
             <a:endParaRPr lang="en-US"/>
           </a:p>
@@ -1733,7 +1737,7 @@
           <a:p>
             <a:fld id="{F6AD1AE7-7C2E-44F3-A585-B0B84B769043}" type="datetimeFigureOut">
               <a:rPr lang="en-US" smtClean="0"/>
-              <a:t>4/15/2015</a:t>
+              <a:t>4/16/2015</a:t>
             </a:fld>
             <a:endParaRPr lang="en-US"/>
           </a:p>
@@ -2047,7 +2051,7 @@
           <a:p>
             <a:fld id="{F6AD1AE7-7C2E-44F3-A585-B0B84B769043}" type="datetimeFigureOut">
               <a:rPr lang="en-US" smtClean="0"/>
-              <a:t>4/15/2015</a:t>
+              <a:t>4/16/2015</a:t>
             </a:fld>
             <a:endParaRPr lang="en-US"/>
           </a:p>
@@ -2434,7 +2438,7 @@
           <a:p>
             <a:fld id="{F6AD1AE7-7C2E-44F3-A585-B0B84B769043}" type="datetimeFigureOut">
               <a:rPr lang="en-US" smtClean="0"/>
-              <a:t>4/15/2015</a:t>
+              <a:t>4/16/2015</a:t>
             </a:fld>
             <a:endParaRPr lang="en-US"/>
           </a:p>
@@ -2604,7 +2608,7 @@
           <a:p>
             <a:fld id="{F6AD1AE7-7C2E-44F3-A585-B0B84B769043}" type="datetimeFigureOut">
               <a:rPr lang="en-US" smtClean="0"/>
-              <a:t>4/15/2015</a:t>
+              <a:t>4/16/2015</a:t>
             </a:fld>
             <a:endParaRPr lang="en-US"/>
           </a:p>
@@ -2784,7 +2788,7 @@
           <a:p>
             <a:fld id="{F6AD1AE7-7C2E-44F3-A585-B0B84B769043}" type="datetimeFigureOut">
               <a:rPr lang="en-US" smtClean="0"/>
-              <a:t>4/15/2015</a:t>
+              <a:t>4/16/2015</a:t>
             </a:fld>
             <a:endParaRPr lang="en-US"/>
           </a:p>
@@ -2954,7 +2958,7 @@
           <a:p>
             <a:fld id="{F6AD1AE7-7C2E-44F3-A585-B0B84B769043}" type="datetimeFigureOut">
               <a:rPr lang="en-US" smtClean="0"/>
-              <a:t>4/15/2015</a:t>
+              <a:t>4/16/2015</a:t>
             </a:fld>
             <a:endParaRPr lang="en-US"/>
           </a:p>
@@ -3201,7 +3205,7 @@
           <a:p>
             <a:fld id="{F6AD1AE7-7C2E-44F3-A585-B0B84B769043}" type="datetimeFigureOut">
               <a:rPr lang="en-US" smtClean="0"/>
-              <a:t>4/15/2015</a:t>
+              <a:t>4/16/2015</a:t>
             </a:fld>
             <a:endParaRPr lang="en-US"/>
           </a:p>
@@ -3433,7 +3437,7 @@
           <a:p>
             <a:fld id="{F6AD1AE7-7C2E-44F3-A585-B0B84B769043}" type="datetimeFigureOut">
               <a:rPr lang="en-US" smtClean="0"/>
-              <a:t>4/15/2015</a:t>
+              <a:t>4/16/2015</a:t>
             </a:fld>
             <a:endParaRPr lang="en-US"/>
           </a:p>
@@ -3807,7 +3811,7 @@
           <a:p>
             <a:fld id="{F6AD1AE7-7C2E-44F3-A585-B0B84B769043}" type="datetimeFigureOut">
               <a:rPr lang="en-US" smtClean="0"/>
-              <a:t>4/15/2015</a:t>
+              <a:t>4/16/2015</a:t>
             </a:fld>
             <a:endParaRPr lang="en-US"/>
           </a:p>
@@ -3930,7 +3934,7 @@
           <a:p>
             <a:fld id="{F6AD1AE7-7C2E-44F3-A585-B0B84B769043}" type="datetimeFigureOut">
               <a:rPr lang="en-US" smtClean="0"/>
-              <a:t>4/15/2015</a:t>
+              <a:t>4/16/2015</a:t>
             </a:fld>
             <a:endParaRPr lang="en-US"/>
           </a:p>
@@ -4025,7 +4029,7 @@
           <a:p>
             <a:fld id="{F6AD1AE7-7C2E-44F3-A585-B0B84B769043}" type="datetimeFigureOut">
               <a:rPr lang="en-US" smtClean="0"/>
-              <a:t>4/15/2015</a:t>
+              <a:t>4/16/2015</a:t>
             </a:fld>
             <a:endParaRPr lang="en-US"/>
           </a:p>
@@ -4280,7 +4284,7 @@
           <a:p>
             <a:fld id="{F6AD1AE7-7C2E-44F3-A585-B0B84B769043}" type="datetimeFigureOut">
               <a:rPr lang="en-US" smtClean="0"/>
-              <a:t>4/15/2015</a:t>
+              <a:t>4/16/2015</a:t>
             </a:fld>
             <a:endParaRPr lang="en-US"/>
           </a:p>
@@ -4543,7 +4547,7 @@
           <a:p>
             <a:fld id="{F6AD1AE7-7C2E-44F3-A585-B0B84B769043}" type="datetimeFigureOut">
               <a:rPr lang="en-US" smtClean="0"/>
-              <a:t>4/15/2015</a:t>
+              <a:t>4/16/2015</a:t>
             </a:fld>
             <a:endParaRPr lang="en-US"/>
           </a:p>
@@ -5288,7 +5292,7 @@
           <a:p>
             <a:fld id="{F6AD1AE7-7C2E-44F3-A585-B0B84B769043}" type="datetimeFigureOut">
               <a:rPr lang="en-US" smtClean="0"/>
-              <a:t>4/15/2015</a:t>
+              <a:t>4/16/2015</a:t>
             </a:fld>
             <a:endParaRPr lang="en-US"/>
           </a:p>
@@ -6179,8 +6183,9 @@
             <a:pPr lvl="1"/>
             <a:r>
               <a:rPr lang="en-US" dirty="0" smtClean="0"/>
-              <a:t>*sample*</a:t>
-            </a:r>
+              <a:t>Creating core functions and </a:t>
+            </a:r>
+            <a:endParaRPr lang="en-US" dirty="0" smtClean="0"/>
           </a:p>
           <a:p>
             <a:r>
@@ -6199,13 +6204,10 @@
           <a:p>
             <a:pPr lvl="1"/>
             <a:r>
-              <a:rPr lang="en-US" dirty="0"/>
-              <a:t>*</a:t>
-            </a:r>
-            <a:r>
               <a:rPr lang="en-US" dirty="0" smtClean="0"/>
-              <a:t>sample*</a:t>
-            </a:r>
+              <a:t>Graphical design/implementation and on-screen text to be typed</a:t>
+            </a:r>
+            <a:endParaRPr lang="en-US" dirty="0" smtClean="0"/>
           </a:p>
         </p:txBody>
       </p:sp>
@@ -6288,8 +6290,22 @@
           <a:p>
             <a:r>
               <a:rPr lang="en-US" dirty="0" smtClean="0"/>
-              <a:t>Displayable Keyboard</a:t>
-            </a:r>
+              <a:t>Displayable </a:t>
+            </a:r>
+            <a:r>
+              <a:rPr lang="en-US" dirty="0" smtClean="0"/>
+              <a:t>Keyboard</a:t>
+            </a:r>
+          </a:p>
+          <a:p>
+            <a:endParaRPr lang="en-US" dirty="0"/>
+          </a:p>
+          <a:p>
+            <a:r>
+              <a:rPr lang="en-US" dirty="0" smtClean="0"/>
+              <a:t>Key press checking</a:t>
+            </a:r>
+            <a:endParaRPr lang="en-US" dirty="0" smtClean="0"/>
           </a:p>
           <a:p>
             <a:endParaRPr lang="en-US" dirty="0"/>
@@ -6344,6 +6360,10 @@
           <a:bodyPr/>
           <a:lstStyle/>
           <a:p>
+            <a:r>
+              <a:rPr lang="en-US" dirty="0" smtClean="0"/>
+              <a:t>Roadblocks</a:t>
+            </a:r>
             <a:endParaRPr lang="en-US" dirty="0"/>
           </a:p>
         </p:txBody>
@@ -6362,6 +6382,36 @@
         <p:txBody>
           <a:bodyPr/>
           <a:lstStyle/>
+          <a:p>
+            <a:r>
+              <a:rPr lang="en-US" dirty="0" smtClean="0"/>
+              <a:t>Image Errors</a:t>
+            </a:r>
+          </a:p>
+          <a:p>
+            <a:endParaRPr lang="en-US" dirty="0" smtClean="0"/>
+          </a:p>
+          <a:p>
+            <a:r>
+              <a:rPr lang="en-US" dirty="0" smtClean="0"/>
+              <a:t>GitHub Syncing</a:t>
+            </a:r>
+          </a:p>
+          <a:p>
+            <a:endParaRPr lang="en-US" dirty="0" smtClean="0"/>
+          </a:p>
+          <a:p>
+            <a:r>
+              <a:rPr lang="en-US" dirty="0" smtClean="0"/>
+              <a:t>Translating Numbers into Characters</a:t>
+            </a:r>
+          </a:p>
+          <a:p>
+            <a:endParaRPr lang="en-US" dirty="0"/>
+          </a:p>
+          <a:p>
+            <a:endParaRPr lang="en-US" dirty="0" smtClean="0"/>
+          </a:p>
           <a:p>
             <a:endParaRPr lang="en-US" dirty="0"/>
           </a:p>
@@ -6370,7 +6420,7 @@
     </p:spTree>
     <p:extLst>
       <p:ext uri="{BB962C8B-B14F-4D97-AF65-F5344CB8AC3E}">
-        <p14:creationId xmlns:p14="http://schemas.microsoft.com/office/powerpoint/2010/main" val="2893164725"/>
+        <p14:creationId xmlns:p14="http://schemas.microsoft.com/office/powerpoint/2010/main" val="1102424208"/>
       </p:ext>
     </p:extLst>
   </p:cSld>
@@ -6414,108 +6464,6 @@
           <a:p>
             <a:r>
               <a:rPr lang="en-US" dirty="0" smtClean="0"/>
-              <a:t>Roadblocks</a:t>
-            </a:r>
-            <a:endParaRPr lang="en-US" dirty="0"/>
-          </a:p>
-        </p:txBody>
-      </p:sp>
-      <p:sp>
-        <p:nvSpPr>
-          <p:cNvPr id="3" name="Content Placeholder 2"/>
-          <p:cNvSpPr>
-            <a:spLocks noGrp="1"/>
-          </p:cNvSpPr>
-          <p:nvPr>
-            <p:ph idx="1"/>
-          </p:nvPr>
-        </p:nvSpPr>
-        <p:spPr/>
-        <p:txBody>
-          <a:bodyPr/>
-          <a:lstStyle/>
-          <a:p>
-            <a:r>
-              <a:rPr lang="en-US" dirty="0" smtClean="0"/>
-              <a:t>Image Errors</a:t>
-            </a:r>
-          </a:p>
-          <a:p>
-            <a:endParaRPr lang="en-US" dirty="0" smtClean="0"/>
-          </a:p>
-          <a:p>
-            <a:r>
-              <a:rPr lang="en-US" dirty="0" smtClean="0"/>
-              <a:t>GitHub Syncing</a:t>
-            </a:r>
-          </a:p>
-          <a:p>
-            <a:endParaRPr lang="en-US" dirty="0" smtClean="0"/>
-          </a:p>
-          <a:p>
-            <a:r>
-              <a:rPr lang="en-US" dirty="0" smtClean="0"/>
-              <a:t>Translating Numbers into Characters</a:t>
-            </a:r>
-          </a:p>
-          <a:p>
-            <a:endParaRPr lang="en-US" dirty="0"/>
-          </a:p>
-          <a:p>
-            <a:endParaRPr lang="en-US" dirty="0" smtClean="0"/>
-          </a:p>
-          <a:p>
-            <a:endParaRPr lang="en-US" dirty="0"/>
-          </a:p>
-        </p:txBody>
-      </p:sp>
-    </p:spTree>
-    <p:extLst>
-      <p:ext uri="{BB962C8B-B14F-4D97-AF65-F5344CB8AC3E}">
-        <p14:creationId xmlns:p14="http://schemas.microsoft.com/office/powerpoint/2010/main" val="1102424208"/>
-      </p:ext>
-    </p:extLst>
-  </p:cSld>
-  <p:clrMapOvr>
-    <a:masterClrMapping/>
-  </p:clrMapOvr>
-</p:sld>
-</file>
-
-<file path=ppt/slides/slide8.xml><?xml version="1.0" encoding="utf-8"?>
-<p:sld xmlns:a="http://schemas.openxmlformats.org/drawingml/2006/main" xmlns:r="http://schemas.openxmlformats.org/officeDocument/2006/relationships" xmlns:p="http://schemas.openxmlformats.org/presentationml/2006/main">
-  <p:cSld>
-    <p:spTree>
-      <p:nvGrpSpPr>
-        <p:cNvPr id="1" name=""/>
-        <p:cNvGrpSpPr/>
-        <p:nvPr/>
-      </p:nvGrpSpPr>
-      <p:grpSpPr>
-        <a:xfrm>
-          <a:off x="0" y="0"/>
-          <a:ext cx="0" cy="0"/>
-          <a:chOff x="0" y="0"/>
-          <a:chExt cx="0" cy="0"/>
-        </a:xfrm>
-      </p:grpSpPr>
-      <p:sp>
-        <p:nvSpPr>
-          <p:cNvPr id="2" name="Title 1"/>
-          <p:cNvSpPr>
-            <a:spLocks noGrp="1"/>
-          </p:cNvSpPr>
-          <p:nvPr>
-            <p:ph type="title"/>
-          </p:nvPr>
-        </p:nvSpPr>
-        <p:spPr/>
-        <p:txBody>
-          <a:bodyPr/>
-          <a:lstStyle/>
-          <a:p>
-            <a:r>
-              <a:rPr lang="en-US" dirty="0" smtClean="0"/>
               <a:t>Timeline to Completion</a:t>
             </a:r>
             <a:endParaRPr lang="en-US" dirty="0"/>
@@ -6554,7 +6502,7 @@
 </p:sld>
 </file>
 
-<file path=ppt/slides/slide9.xml><?xml version="1.0" encoding="utf-8"?>
+<file path=ppt/slides/slide8.xml><?xml version="1.0" encoding="utf-8"?>
 <p:sld xmlns:a="http://schemas.openxmlformats.org/drawingml/2006/main" xmlns:r="http://schemas.openxmlformats.org/officeDocument/2006/relationships" xmlns:p="http://schemas.openxmlformats.org/presentationml/2006/main">
   <p:cSld>
     <p:spTree>

</xml_diff>